<commit_message>
wek 9 changes I guess
</commit_message>
<xml_diff>
--- a/week09/week09.pptx
+++ b/week09/week09.pptx
@@ -231,7 +231,7 @@
             <a:fld id="{A97C8422-C8B8-4BC4-B711-60DC022E0201}" type="datetimeFigureOut">
               <a:rPr lang="en-US" smtClean="0"/>
               <a:pPr/>
-              <a:t>10/14/14</a:t>
+              <a:t>10/19/14</a:t>
             </a:fld>
             <a:endParaRPr lang="en-US"/>
           </a:p>
@@ -1357,7 +1357,7 @@
             <a:fld id="{6534EC56-5BE0-CF40-A0E9-9B07941CA105}" type="datetimeFigureOut">
               <a:rPr lang="en-US" smtClean="0"/>
               <a:pPr/>
-              <a:t>10/14/14</a:t>
+              <a:t>10/19/14</a:t>
             </a:fld>
             <a:endParaRPr lang="en-US"/>
           </a:p>
@@ -1691,7 +1691,7 @@
             <a:fld id="{6534EC56-5BE0-CF40-A0E9-9B07941CA105}" type="datetimeFigureOut">
               <a:rPr lang="en-US" smtClean="0"/>
               <a:pPr/>
-              <a:t>10/14/14</a:t>
+              <a:t>10/19/14</a:t>
             </a:fld>
             <a:endParaRPr lang="en-US"/>
           </a:p>
@@ -2025,7 +2025,7 @@
             <a:fld id="{6534EC56-5BE0-CF40-A0E9-9B07941CA105}" type="datetimeFigureOut">
               <a:rPr lang="en-US" smtClean="0"/>
               <a:pPr/>
-              <a:t>10/14/14</a:t>
+              <a:t>10/19/14</a:t>
             </a:fld>
             <a:endParaRPr lang="en-US"/>
           </a:p>
@@ -2359,7 +2359,7 @@
             <a:fld id="{6534EC56-5BE0-CF40-A0E9-9B07941CA105}" type="datetimeFigureOut">
               <a:rPr lang="en-US" smtClean="0"/>
               <a:pPr/>
-              <a:t>10/14/14</a:t>
+              <a:t>10/19/14</a:t>
             </a:fld>
             <a:endParaRPr lang="en-US"/>
           </a:p>
@@ -3050,7 +3050,7 @@
             <a:fld id="{6534EC56-5BE0-CF40-A0E9-9B07941CA105}" type="datetimeFigureOut">
               <a:rPr lang="en-US" smtClean="0"/>
               <a:pPr/>
-              <a:t>10/14/14</a:t>
+              <a:t>10/19/14</a:t>
             </a:fld>
             <a:endParaRPr lang="en-US"/>
           </a:p>
@@ -3231,7 +3231,7 @@
             <a:fld id="{6534EC56-5BE0-CF40-A0E9-9B07941CA105}" type="datetimeFigureOut">
               <a:rPr lang="en-US" smtClean="0"/>
               <a:pPr/>
-              <a:t>10/14/14</a:t>
+              <a:t>10/19/14</a:t>
             </a:fld>
             <a:endParaRPr lang="en-US"/>
           </a:p>
@@ -3407,7 +3407,7 @@
             <a:fld id="{6534EC56-5BE0-CF40-A0E9-9B07941CA105}" type="datetimeFigureOut">
               <a:rPr lang="en-US" smtClean="0"/>
               <a:pPr/>
-              <a:t>10/14/14</a:t>
+              <a:t>10/19/14</a:t>
             </a:fld>
             <a:endParaRPr lang="en-US"/>
           </a:p>
@@ -3657,7 +3657,7 @@
             <a:fld id="{6534EC56-5BE0-CF40-A0E9-9B07941CA105}" type="datetimeFigureOut">
               <a:rPr lang="en-US" smtClean="0"/>
               <a:pPr/>
-              <a:t>10/14/14</a:t>
+              <a:t>10/19/14</a:t>
             </a:fld>
             <a:endParaRPr lang="en-US"/>
           </a:p>
@@ -3989,7 +3989,7 @@
             <a:fld id="{6534EC56-5BE0-CF40-A0E9-9B07941CA105}" type="datetimeFigureOut">
               <a:rPr lang="en-US" smtClean="0"/>
               <a:pPr/>
-              <a:t>10/14/14</a:t>
+              <a:t>10/19/14</a:t>
             </a:fld>
             <a:endParaRPr lang="en-US"/>
           </a:p>
@@ -4283,7 +4283,7 @@
             <a:fld id="{6534EC56-5BE0-CF40-A0E9-9B07941CA105}" type="datetimeFigureOut">
               <a:rPr lang="en-US" smtClean="0"/>
               <a:pPr/>
-              <a:t>10/14/14</a:t>
+              <a:t>10/19/14</a:t>
             </a:fld>
             <a:endParaRPr lang="en-US"/>
           </a:p>
@@ -4721,7 +4721,7 @@
             <a:fld id="{6534EC56-5BE0-CF40-A0E9-9B07941CA105}" type="datetimeFigureOut">
               <a:rPr lang="en-US" smtClean="0"/>
               <a:pPr/>
-              <a:t>10/14/14</a:t>
+              <a:t>10/19/14</a:t>
             </a:fld>
             <a:endParaRPr lang="en-US"/>
           </a:p>
@@ -4910,7 +4910,7 @@
             <a:fld id="{6534EC56-5BE0-CF40-A0E9-9B07941CA105}" type="datetimeFigureOut">
               <a:rPr lang="en-US" smtClean="0"/>
               <a:pPr/>
-              <a:t>10/14/14</a:t>
+              <a:t>10/19/14</a:t>
             </a:fld>
             <a:endParaRPr lang="en-US"/>
           </a:p>
@@ -5002,7 +5002,7 @@
             <a:fld id="{6534EC56-5BE0-CF40-A0E9-9B07941CA105}" type="datetimeFigureOut">
               <a:rPr lang="en-US" smtClean="0"/>
               <a:pPr/>
-              <a:t>10/14/14</a:t>
+              <a:t>10/19/14</a:t>
             </a:fld>
             <a:endParaRPr lang="en-US"/>
           </a:p>
@@ -5285,7 +5285,7 @@
             <a:fld id="{6534EC56-5BE0-CF40-A0E9-9B07941CA105}" type="datetimeFigureOut">
               <a:rPr lang="en-US" smtClean="0"/>
               <a:pPr/>
-              <a:t>10/14/14</a:t>
+              <a:t>10/19/14</a:t>
             </a:fld>
             <a:endParaRPr lang="en-US"/>
           </a:p>
@@ -5508,7 +5508,7 @@
             <a:fld id="{6534EC56-5BE0-CF40-A0E9-9B07941CA105}" type="datetimeFigureOut">
               <a:rPr lang="en-US" smtClean="0"/>
               <a:pPr/>
-              <a:t>10/14/14</a:t>
+              <a:t>10/19/14</a:t>
             </a:fld>
             <a:endParaRPr lang="en-US"/>
           </a:p>
@@ -11129,7 +11129,9 @@
         </p:nvSpPr>
         <p:spPr/>
         <p:txBody>
-          <a:bodyPr/>
+          <a:bodyPr>
+            <a:normAutofit fontScale="92500" lnSpcReduction="10000"/>
+          </a:bodyPr>
           <a:lstStyle/>
           <a:p>
             <a:r>
@@ -11187,11 +11189,11 @@
             </a:r>
             <a:r>
               <a:rPr lang="en-US" dirty="0" smtClean="0"/>
-              <a:t>')" </a:t>
-            </a:r>
-            <a:r>
-              <a:rPr lang="en-US" smtClean="0"/>
-              <a:t>then "url.parse</a:t>
+              <a:t>')" then "</a:t>
+            </a:r>
+            <a:r>
+              <a:rPr lang="en-US" dirty="0" err="1" smtClean="0"/>
+              <a:t>url.parse</a:t>
             </a:r>
             <a:r>
               <a:rPr lang="en-US" dirty="0" smtClean="0"/>
@@ -11203,8 +11205,38 @@
             </a:r>
             <a:r>
               <a:rPr lang="en-US" dirty="0" smtClean="0"/>
-              <a:t>, true)"</a:t>
-            </a:r>
+              <a:t>, true)</a:t>
+            </a:r>
+            <a:r>
+              <a:rPr lang="en-US" dirty="0" smtClean="0"/>
+              <a:t>"</a:t>
+            </a:r>
+          </a:p>
+          <a:p>
+            <a:r>
+              <a:rPr lang="en-US" dirty="0"/>
+              <a:t>write an HTTP server that you can save something to.</a:t>
+            </a:r>
+          </a:p>
+          <a:p>
+            <a:pPr lvl="1"/>
+            <a:r>
+              <a:rPr lang="en-US" dirty="0"/>
+              <a:t>you can perhaps pass in the data in the query string, like a server that, if you visit /</a:t>
+            </a:r>
+            <a:r>
+              <a:rPr lang="en-US" dirty="0" err="1"/>
+              <a:t>save?hello</a:t>
+            </a:r>
+            <a:r>
+              <a:rPr lang="en-US" dirty="0"/>
+              <a:t>, will write "hello" into a text </a:t>
+            </a:r>
+            <a:r>
+              <a:rPr lang="en-US" dirty="0" smtClean="0"/>
+              <a:t>file</a:t>
+            </a:r>
+            <a:endParaRPr lang="en-US" dirty="0" smtClean="0"/>
           </a:p>
           <a:p>
             <a:r>

</xml_diff>